<commit_message>
Added current ver screenshot
</commit_message>
<xml_diff>
--- a/Baller PowerShell Prompts/cool prompts.pptx
+++ b/Baller PowerShell Prompts/cool prompts.pptx
@@ -5,7 +5,7 @@
     <p:sldMasterId id="2147483690" r:id="rId1"/>
   </p:sldMasterIdLst>
   <p:notesMasterIdLst>
-    <p:notesMasterId r:id="rId11"/>
+    <p:notesMasterId r:id="rId12"/>
   </p:notesMasterIdLst>
   <p:sldIdLst>
     <p:sldId id="256" r:id="rId2"/>
@@ -15,8 +15,9 @@
     <p:sldId id="274" r:id="rId6"/>
     <p:sldId id="275" r:id="rId7"/>
     <p:sldId id="276" r:id="rId8"/>
-    <p:sldId id="277" r:id="rId9"/>
-    <p:sldId id="271" r:id="rId10"/>
+    <p:sldId id="278" r:id="rId9"/>
+    <p:sldId id="277" r:id="rId10"/>
+    <p:sldId id="271" r:id="rId11"/>
   </p:sldIdLst>
   <p:sldSz cx="12192000" cy="6858000"/>
   <p:notesSz cx="6858000" cy="9144000"/>
@@ -1091,7 +1092,7 @@
           <a:p>
             <a:fld id="{E146AA1A-B7D1-44D0-80EF-95365020B614}" type="slidenum">
               <a:rPr lang="en-US" smtClean="0"/>
-              <a:t>9</a:t>
+              <a:t>10</a:t>
             </a:fld>
             <a:endParaRPr lang="en-US"/>
           </a:p>
@@ -5205,6 +5206,564 @@
       </p:transition>
     </mc:Fallback>
   </mc:AlternateContent>
+</p:sld>
+</file>
+
+<file path=ppt/slides/slide10.xml><?xml version="1.0" encoding="utf-8"?>
+<p:sld xmlns:a="http://schemas.openxmlformats.org/drawingml/2006/main" xmlns:r="http://schemas.openxmlformats.org/officeDocument/2006/relationships" xmlns:p="http://schemas.openxmlformats.org/presentationml/2006/main">
+  <p:cSld>
+    <p:spTree>
+      <p:nvGrpSpPr>
+        <p:cNvPr id="1" name=""/>
+        <p:cNvGrpSpPr/>
+        <p:nvPr/>
+      </p:nvGrpSpPr>
+      <p:grpSpPr>
+        <a:xfrm>
+          <a:off x="0" y="0"/>
+          <a:ext cx="0" cy="0"/>
+          <a:chOff x="0" y="0"/>
+          <a:chExt cx="0" cy="0"/>
+        </a:xfrm>
+      </p:grpSpPr>
+      <p:sp>
+        <p:nvSpPr>
+          <p:cNvPr id="2" name="Title 1">
+            <a:extLst>
+              <a:ext uri="{FF2B5EF4-FFF2-40B4-BE49-F238E27FC236}">
+                <a16:creationId xmlns:a16="http://schemas.microsoft.com/office/drawing/2014/main" id="{97A62892-0949-4D84-B5A8-62A8F1EDA293}"/>
+              </a:ext>
+            </a:extLst>
+          </p:cNvPr>
+          <p:cNvSpPr>
+            <a:spLocks noGrp="1"/>
+          </p:cNvSpPr>
+          <p:nvPr>
+            <p:ph type="title"/>
+          </p:nvPr>
+        </p:nvSpPr>
+        <p:spPr>
+          <a:xfrm>
+            <a:off x="4970109" y="484632"/>
+            <a:ext cx="6730277" cy="1609344"/>
+          </a:xfrm>
+          <a:ln>
+            <a:noFill/>
+          </a:ln>
+        </p:spPr>
+        <p:txBody>
+          <a:bodyPr vert="horz" lIns="91440" tIns="45720" rIns="91440" bIns="45720" rtlCol="0" anchor="ctr">
+            <a:normAutofit/>
+          </a:bodyPr>
+          <a:lstStyle/>
+          <a:p>
+            <a:r>
+              <a:rPr lang="en-US" sz="4800" dirty="0">
+                <a:latin typeface="+mn-lt"/>
+              </a:rPr>
+              <a:t>Questions?</a:t>
+            </a:r>
+          </a:p>
+        </p:txBody>
+      </p:sp>
+      <p:pic>
+        <p:nvPicPr>
+          <p:cNvPr id="7" name="Picture Placeholder 6">
+            <a:extLst>
+              <a:ext uri="{FF2B5EF4-FFF2-40B4-BE49-F238E27FC236}">
+                <a16:creationId xmlns:a16="http://schemas.microsoft.com/office/drawing/2014/main" id="{7E7732E9-971A-411E-9814-B8A7D3D9DC0F}"/>
+              </a:ext>
+            </a:extLst>
+          </p:cNvPr>
+          <p:cNvPicPr>
+            <a:picLocks noGrp="1" noChangeAspect="1"/>
+          </p:cNvPicPr>
+          <p:nvPr>
+            <p:ph type="pic" idx="1"/>
+          </p:nvPr>
+        </p:nvPicPr>
+        <p:blipFill rotWithShape="1">
+          <a:blip r:embed="rId3">
+            <a:extLst>
+              <a:ext uri="{28A0092B-C50C-407E-A947-70E740481C1C}">
+                <a14:useLocalDpi xmlns:a14="http://schemas.microsoft.com/office/drawing/2010/main" val="0"/>
+              </a:ext>
+            </a:extLst>
+          </a:blip>
+          <a:srcRect l="681" r="28739"/>
+          <a:stretch/>
+        </p:blipFill>
+        <p:spPr>
+          <a:xfrm>
+            <a:off x="3344" y="10"/>
+            <a:ext cx="4646726" cy="6857990"/>
+          </a:xfrm>
+          <a:prstGeom prst="rect">
+            <a:avLst/>
+          </a:prstGeom>
+        </p:spPr>
+      </p:pic>
+      <p:sp>
+        <p:nvSpPr>
+          <p:cNvPr id="4" name="Text Placeholder 3">
+            <a:extLst>
+              <a:ext uri="{FF2B5EF4-FFF2-40B4-BE49-F238E27FC236}">
+                <a16:creationId xmlns:a16="http://schemas.microsoft.com/office/drawing/2014/main" id="{428897B1-F414-45D0-A4AE-36AC2244AD13}"/>
+              </a:ext>
+            </a:extLst>
+          </p:cNvPr>
+          <p:cNvSpPr>
+            <a:spLocks noGrp="1"/>
+          </p:cNvSpPr>
+          <p:nvPr>
+            <p:ph type="body" sz="half" idx="2"/>
+          </p:nvPr>
+        </p:nvSpPr>
+        <p:spPr>
+          <a:xfrm>
+            <a:off x="4970109" y="1624083"/>
+            <a:ext cx="6730276" cy="4954137"/>
+          </a:xfrm>
+        </p:spPr>
+        <p:txBody>
+          <a:bodyPr vert="horz" lIns="91440" tIns="45720" rIns="91440" bIns="45720" rtlCol="0">
+            <a:normAutofit fontScale="92500" lnSpcReduction="10000"/>
+          </a:bodyPr>
+          <a:lstStyle/>
+          <a:p>
+            <a:pPr marL="514350" lvl="1" indent="-285750" defTabSz="932742">
+              <a:lnSpc>
+                <a:spcPct val="100000"/>
+              </a:lnSpc>
+              <a:spcBef>
+                <a:spcPct val="20000"/>
+              </a:spcBef>
+              <a:spcAft>
+                <a:spcPts val="600"/>
+              </a:spcAft>
+              <a:buClrTx/>
+              <a:buSzPct val="90000"/>
+              <a:buBlip>
+                <a:blip r:embed="rId4"/>
+              </a:buBlip>
+            </a:pPr>
+            <a:r>
+              <a:rPr lang="en-US" sz="2400" dirty="0">
+                <a:latin typeface="Segoe UI"/>
+              </a:rPr>
+              <a:t>@</a:t>
+            </a:r>
+            <a:r>
+              <a:rPr lang="en-US" sz="2400" dirty="0" err="1">
+                <a:latin typeface="Segoe UI"/>
+              </a:rPr>
+              <a:t>MrThomasRayner</a:t>
+            </a:r>
+            <a:endParaRPr lang="en-US" sz="2400" dirty="0">
+              <a:latin typeface="Segoe UI"/>
+            </a:endParaRPr>
+          </a:p>
+          <a:p>
+            <a:pPr marL="514350" lvl="1" indent="-285750" defTabSz="932742">
+              <a:lnSpc>
+                <a:spcPct val="100000"/>
+              </a:lnSpc>
+              <a:spcBef>
+                <a:spcPct val="20000"/>
+              </a:spcBef>
+              <a:spcAft>
+                <a:spcPts val="600"/>
+              </a:spcAft>
+              <a:buClrTx/>
+              <a:buSzPct val="90000"/>
+              <a:buBlip>
+                <a:blip r:embed="rId4"/>
+              </a:buBlip>
+            </a:pPr>
+            <a:endParaRPr lang="en-US" sz="2400" dirty="0">
+              <a:latin typeface="Segoe UI"/>
+            </a:endParaRPr>
+          </a:p>
+          <a:p>
+            <a:pPr marL="514350" lvl="1" indent="-285750" defTabSz="932742">
+              <a:lnSpc>
+                <a:spcPct val="100000"/>
+              </a:lnSpc>
+              <a:spcBef>
+                <a:spcPct val="20000"/>
+              </a:spcBef>
+              <a:spcAft>
+                <a:spcPts val="600"/>
+              </a:spcAft>
+              <a:buClrTx/>
+              <a:buSzPct val="90000"/>
+              <a:buBlip>
+                <a:blip r:embed="rId4"/>
+              </a:buBlip>
+            </a:pPr>
+            <a:r>
+              <a:rPr lang="en-US" sz="2400" dirty="0">
+                <a:latin typeface="Segoe UI"/>
+              </a:rPr>
+              <a:t>thomasrayner.ca</a:t>
+            </a:r>
+          </a:p>
+          <a:p>
+            <a:pPr marL="514350" lvl="1" indent="-285750" defTabSz="932742">
+              <a:lnSpc>
+                <a:spcPct val="100000"/>
+              </a:lnSpc>
+              <a:spcBef>
+                <a:spcPct val="20000"/>
+              </a:spcBef>
+              <a:spcAft>
+                <a:spcPts val="600"/>
+              </a:spcAft>
+              <a:buClrTx/>
+              <a:buSzPct val="90000"/>
+              <a:buBlip>
+                <a:blip r:embed="rId4"/>
+              </a:buBlip>
+            </a:pPr>
+            <a:endParaRPr lang="en-US" sz="2400" dirty="0">
+              <a:latin typeface="Segoe UI"/>
+            </a:endParaRPr>
+          </a:p>
+          <a:p>
+            <a:pPr marL="514350" lvl="1" indent="-285750" defTabSz="932742">
+              <a:lnSpc>
+                <a:spcPct val="100000"/>
+              </a:lnSpc>
+              <a:spcBef>
+                <a:spcPct val="20000"/>
+              </a:spcBef>
+              <a:spcAft>
+                <a:spcPts val="600"/>
+              </a:spcAft>
+              <a:buClrTx/>
+              <a:buSzPct val="90000"/>
+              <a:buBlip>
+                <a:blip r:embed="rId4"/>
+              </a:buBlip>
+            </a:pPr>
+            <a:r>
+              <a:rPr lang="en-US" sz="2400" dirty="0">
+                <a:latin typeface="Segoe UI"/>
+              </a:rPr>
+              <a:t>github.com/</a:t>
+            </a:r>
+            <a:r>
+              <a:rPr lang="en-US" sz="2400" dirty="0" err="1">
+                <a:latin typeface="Segoe UI"/>
+              </a:rPr>
+              <a:t>thomasrayner</a:t>
+            </a:r>
+            <a:endParaRPr lang="en-US" sz="2400" dirty="0">
+              <a:latin typeface="Segoe UI"/>
+            </a:endParaRPr>
+          </a:p>
+          <a:p>
+            <a:pPr marL="514350" lvl="1" indent="-285750" defTabSz="932742">
+              <a:lnSpc>
+                <a:spcPct val="100000"/>
+              </a:lnSpc>
+              <a:spcBef>
+                <a:spcPct val="20000"/>
+              </a:spcBef>
+              <a:spcAft>
+                <a:spcPts val="0"/>
+              </a:spcAft>
+              <a:buClrTx/>
+              <a:buSzPct val="90000"/>
+              <a:buBlip>
+                <a:blip r:embed="rId4"/>
+              </a:buBlip>
+            </a:pPr>
+            <a:endParaRPr lang="en-US" sz="2400" dirty="0">
+              <a:latin typeface="Segoe UI"/>
+            </a:endParaRPr>
+          </a:p>
+          <a:p>
+            <a:pPr marL="514350" lvl="1" indent="-285750" defTabSz="932742">
+              <a:lnSpc>
+                <a:spcPct val="100000"/>
+              </a:lnSpc>
+              <a:spcBef>
+                <a:spcPct val="20000"/>
+              </a:spcBef>
+              <a:spcAft>
+                <a:spcPts val="0"/>
+              </a:spcAft>
+              <a:buClrTx/>
+              <a:buSzPct val="90000"/>
+              <a:buBlip>
+                <a:blip r:embed="rId4"/>
+              </a:buBlip>
+            </a:pPr>
+            <a:r>
+              <a:rPr lang="en-US" sz="2400" dirty="0">
+                <a:latin typeface="Segoe UI"/>
+              </a:rPr>
+              <a:t>PowerShell </a:t>
+            </a:r>
+            <a:r>
+              <a:rPr lang="en-US" sz="2400" dirty="0">
+                <a:solidFill>
+                  <a:srgbClr val="00B294"/>
+                </a:solidFill>
+                <a:latin typeface="Segoe UI"/>
+              </a:rPr>
+              <a:t>Discord</a:t>
+            </a:r>
+            <a:r>
+              <a:rPr lang="en-US" sz="2400" dirty="0">
+                <a:latin typeface="Segoe UI"/>
+              </a:rPr>
+              <a:t>/</a:t>
+            </a:r>
+            <a:r>
+              <a:rPr lang="en-US" sz="2400" dirty="0">
+                <a:solidFill>
+                  <a:srgbClr val="00BCF2"/>
+                </a:solidFill>
+                <a:latin typeface="Segoe UI"/>
+              </a:rPr>
+              <a:t>Slack</a:t>
+            </a:r>
+            <a:r>
+              <a:rPr lang="en-US" sz="2400" dirty="0">
+                <a:gradFill>
+                  <a:gsLst>
+                    <a:gs pos="1250">
+                      <a:prstClr val="white"/>
+                    </a:gs>
+                    <a:gs pos="100000">
+                      <a:prstClr val="white"/>
+                    </a:gs>
+                  </a:gsLst>
+                  <a:lin ang="5400000" scaled="0"/>
+                </a:gradFill>
+                <a:latin typeface="Segoe UI"/>
+              </a:rPr>
+              <a:t> 	</a:t>
+            </a:r>
+          </a:p>
+          <a:p>
+            <a:pPr marL="228600" lvl="1" defTabSz="932742">
+              <a:lnSpc>
+                <a:spcPct val="100000"/>
+              </a:lnSpc>
+              <a:spcBef>
+                <a:spcPts val="0"/>
+              </a:spcBef>
+              <a:spcAft>
+                <a:spcPts val="600"/>
+              </a:spcAft>
+              <a:buClrTx/>
+              <a:buSzPct val="90000"/>
+            </a:pPr>
+            <a:r>
+              <a:rPr lang="en-US" sz="1800" dirty="0">
+                <a:solidFill>
+                  <a:prstClr val="white"/>
+                </a:solidFill>
+                <a:latin typeface="Segoe UI"/>
+              </a:rPr>
+              <a:t>          </a:t>
+            </a:r>
+            <a:r>
+              <a:rPr lang="en-US" sz="1800" dirty="0">
+                <a:latin typeface="Segoe UI"/>
+              </a:rPr>
+              <a:t>Join</a:t>
+            </a:r>
+            <a:r>
+              <a:rPr lang="en-US" sz="1800" dirty="0">
+                <a:solidFill>
+                  <a:prstClr val="white"/>
+                </a:solidFill>
+                <a:latin typeface="Segoe UI"/>
+              </a:rPr>
+              <a:t>: </a:t>
+            </a:r>
+            <a:r>
+              <a:rPr lang="en-US" sz="1800" dirty="0">
+                <a:solidFill>
+                  <a:srgbClr val="00B294"/>
+                </a:solidFill>
+                <a:latin typeface="Segoe UI"/>
+              </a:rPr>
+              <a:t>j.mp/</a:t>
+            </a:r>
+            <a:r>
+              <a:rPr lang="en-US" sz="1800" dirty="0" err="1">
+                <a:solidFill>
+                  <a:srgbClr val="00B294"/>
+                </a:solidFill>
+                <a:latin typeface="Segoe UI"/>
+              </a:rPr>
+              <a:t>psdiscord</a:t>
+            </a:r>
+            <a:r>
+              <a:rPr lang="en-US" sz="1800" dirty="0">
+                <a:latin typeface="Segoe UI"/>
+              </a:rPr>
+              <a:t> or </a:t>
+            </a:r>
+            <a:r>
+              <a:rPr lang="en-US" sz="1800" dirty="0">
+                <a:solidFill>
+                  <a:srgbClr val="00BCF2"/>
+                </a:solidFill>
+                <a:latin typeface="Segoe UI"/>
+              </a:rPr>
+              <a:t>j.mp/</a:t>
+            </a:r>
+            <a:r>
+              <a:rPr lang="en-US" sz="1800" dirty="0" err="1">
+                <a:solidFill>
+                  <a:srgbClr val="00BCF2"/>
+                </a:solidFill>
+                <a:latin typeface="Segoe UI"/>
+              </a:rPr>
+              <a:t>psslack</a:t>
+            </a:r>
+            <a:endParaRPr lang="en-US" sz="1800" dirty="0">
+              <a:solidFill>
+                <a:srgbClr val="00BCF2"/>
+              </a:solidFill>
+              <a:latin typeface="Segoe UI"/>
+            </a:endParaRPr>
+          </a:p>
+          <a:p>
+            <a:pPr marL="514350" lvl="1" indent="-285750" defTabSz="932742">
+              <a:lnSpc>
+                <a:spcPct val="100000"/>
+              </a:lnSpc>
+              <a:spcBef>
+                <a:spcPts val="0"/>
+              </a:spcBef>
+              <a:spcAft>
+                <a:spcPts val="600"/>
+              </a:spcAft>
+              <a:buClrTx/>
+              <a:buSzPct val="90000"/>
+              <a:buBlip>
+                <a:blip r:embed="rId4"/>
+              </a:buBlip>
+            </a:pPr>
+            <a:endParaRPr lang="en-US" sz="2400" dirty="0">
+              <a:latin typeface="Segoe UI"/>
+            </a:endParaRPr>
+          </a:p>
+          <a:p>
+            <a:pPr marL="514350" lvl="1" indent="-285750" defTabSz="932742">
+              <a:lnSpc>
+                <a:spcPct val="100000"/>
+              </a:lnSpc>
+              <a:spcBef>
+                <a:spcPts val="0"/>
+              </a:spcBef>
+              <a:spcAft>
+                <a:spcPts val="600"/>
+              </a:spcAft>
+              <a:buClrTx/>
+              <a:buSzPct val="90000"/>
+              <a:buBlip>
+                <a:blip r:embed="rId4"/>
+              </a:buBlip>
+            </a:pPr>
+            <a:r>
+              <a:rPr lang="en-US" sz="2400" dirty="0">
+                <a:latin typeface="Segoe UI"/>
+              </a:rPr>
+              <a:t>pluralsight.com/authors/</a:t>
+            </a:r>
+            <a:r>
+              <a:rPr lang="en-US" sz="2400" dirty="0" err="1">
+                <a:latin typeface="Segoe UI"/>
+              </a:rPr>
+              <a:t>thomas-rayner</a:t>
+            </a:r>
+            <a:endParaRPr lang="en-US" sz="2400" dirty="0">
+              <a:latin typeface="Segoe UI"/>
+            </a:endParaRPr>
+          </a:p>
+          <a:p>
+            <a:pPr marL="514350" lvl="1" indent="-285750" defTabSz="932742">
+              <a:lnSpc>
+                <a:spcPct val="100000"/>
+              </a:lnSpc>
+              <a:spcBef>
+                <a:spcPts val="0"/>
+              </a:spcBef>
+              <a:spcAft>
+                <a:spcPts val="600"/>
+              </a:spcAft>
+              <a:buClrTx/>
+              <a:buSzPct val="90000"/>
+              <a:buBlip>
+                <a:blip r:embed="rId4"/>
+              </a:buBlip>
+            </a:pPr>
+            <a:endParaRPr lang="en-US" sz="2400" dirty="0">
+              <a:latin typeface="Segoe UI"/>
+            </a:endParaRPr>
+          </a:p>
+          <a:p>
+            <a:pPr marL="514350" lvl="1" indent="-285750" defTabSz="932742">
+              <a:lnSpc>
+                <a:spcPct val="100000"/>
+              </a:lnSpc>
+              <a:spcBef>
+                <a:spcPts val="0"/>
+              </a:spcBef>
+              <a:spcAft>
+                <a:spcPts val="600"/>
+              </a:spcAft>
+              <a:buClrTx/>
+              <a:buSzPct val="90000"/>
+              <a:buBlip>
+                <a:blip r:embed="rId4"/>
+              </a:buBlip>
+            </a:pPr>
+            <a:r>
+              <a:rPr lang="en-US" sz="2400" dirty="0">
+                <a:latin typeface="Segoe UI"/>
+              </a:rPr>
+              <a:t>Master PowerShell Tricks books</a:t>
+            </a:r>
+            <a:endParaRPr lang="en-US" sz="3200" dirty="0">
+              <a:latin typeface="Segoe UI"/>
+            </a:endParaRPr>
+          </a:p>
+          <a:p>
+            <a:pPr>
+              <a:lnSpc>
+                <a:spcPct val="90000"/>
+              </a:lnSpc>
+            </a:pPr>
+            <a:endParaRPr lang="en-US" sz="2800" dirty="0">
+              <a:solidFill>
+                <a:schemeClr val="tx1"/>
+              </a:solidFill>
+            </a:endParaRPr>
+          </a:p>
+        </p:txBody>
+      </p:sp>
+    </p:spTree>
+    <p:extLst>
+      <p:ext uri="{BB962C8B-B14F-4D97-AF65-F5344CB8AC3E}">
+        <p14:creationId xmlns:p14="http://schemas.microsoft.com/office/powerpoint/2010/main" val="3379601973"/>
+      </p:ext>
+    </p:extLst>
+  </p:cSld>
+  <p:clrMapOvr>
+    <a:masterClrMapping/>
+  </p:clrMapOvr>
+  <p:transition spd="med">
+    <p:pull/>
+  </p:transition>
 </p:sld>
 </file>
 
@@ -10847,6 +11406,354 @@
       </p:grpSpPr>
       <p:sp>
         <p:nvSpPr>
+          <p:cNvPr id="2" name="Title 1">
+            <a:extLst>
+              <a:ext uri="{FF2B5EF4-FFF2-40B4-BE49-F238E27FC236}">
+                <a16:creationId xmlns:a16="http://schemas.microsoft.com/office/drawing/2014/main" id="{6C751267-D750-4B03-90FF-2B4D11EC25AC}"/>
+              </a:ext>
+            </a:extLst>
+          </p:cNvPr>
+          <p:cNvSpPr>
+            <a:spLocks noGrp="1"/>
+          </p:cNvSpPr>
+          <p:nvPr>
+            <p:ph type="title"/>
+          </p:nvPr>
+        </p:nvSpPr>
+        <p:spPr>
+          <a:xfrm>
+            <a:off x="7865806" y="484632"/>
+            <a:ext cx="3677264" cy="1609344"/>
+          </a:xfrm>
+        </p:spPr>
+        <p:txBody>
+          <a:bodyPr>
+            <a:normAutofit/>
+          </a:bodyPr>
+          <a:lstStyle/>
+          <a:p>
+            <a:r>
+              <a:rPr lang="en-US" sz="3600"/>
+              <a:t>Where am I going with this?</a:t>
+            </a:r>
+          </a:p>
+        </p:txBody>
+      </p:sp>
+      <p:pic>
+        <p:nvPicPr>
+          <p:cNvPr id="25" name="Content Placeholder 3">
+            <a:extLst>
+              <a:ext uri="{FF2B5EF4-FFF2-40B4-BE49-F238E27FC236}">
+                <a16:creationId xmlns:a16="http://schemas.microsoft.com/office/drawing/2014/main" id="{42B5DA84-A3F2-4DB3-8965-CF5C0B911635}"/>
+              </a:ext>
+            </a:extLst>
+          </p:cNvPr>
+          <p:cNvPicPr>
+            <a:picLocks noChangeAspect="1"/>
+          </p:cNvPicPr>
+          <p:nvPr/>
+        </p:nvPicPr>
+        <p:blipFill>
+          <a:blip r:embed="rId2"/>
+          <a:stretch>
+            <a:fillRect/>
+          </a:stretch>
+        </p:blipFill>
+        <p:spPr>
+          <a:xfrm>
+            <a:off x="1" y="866657"/>
+            <a:ext cx="7865804" cy="5348746"/>
+          </a:xfrm>
+          <a:prstGeom prst="rect">
+            <a:avLst/>
+          </a:prstGeom>
+        </p:spPr>
+      </p:pic>
+      <p:sp>
+        <p:nvSpPr>
+          <p:cNvPr id="9" name="Content Placeholder 8">
+            <a:extLst>
+              <a:ext uri="{FF2B5EF4-FFF2-40B4-BE49-F238E27FC236}">
+                <a16:creationId xmlns:a16="http://schemas.microsoft.com/office/drawing/2014/main" id="{E0B313A3-0273-4EDF-ABFD-BF0C1ED013EC}"/>
+              </a:ext>
+            </a:extLst>
+          </p:cNvPr>
+          <p:cNvSpPr>
+            <a:spLocks noGrp="1"/>
+          </p:cNvSpPr>
+          <p:nvPr>
+            <p:ph idx="1"/>
+          </p:nvPr>
+        </p:nvSpPr>
+        <p:spPr>
+          <a:xfrm>
+            <a:off x="7865805" y="2121408"/>
+            <a:ext cx="3677263" cy="4092579"/>
+          </a:xfrm>
+        </p:spPr>
+        <p:txBody>
+          <a:bodyPr>
+            <a:normAutofit/>
+          </a:bodyPr>
+          <a:lstStyle/>
+          <a:p>
+            <a:r>
+              <a:rPr lang="en-US" sz="1600" dirty="0"/>
+              <a:t>This is my daily driver</a:t>
+            </a:r>
+          </a:p>
+          <a:p>
+            <a:r>
+              <a:rPr lang="en-US" sz="1600" dirty="0"/>
+              <a:t>Info that’s important to me</a:t>
+            </a:r>
+          </a:p>
+          <a:p>
+            <a:r>
+              <a:rPr lang="en-US" sz="1600" dirty="0"/>
+              <a:t>Custom colors and chars that I find pleasing</a:t>
+            </a:r>
+          </a:p>
+        </p:txBody>
+      </p:sp>
+    </p:spTree>
+    <p:extLst>
+      <p:ext uri="{BB962C8B-B14F-4D97-AF65-F5344CB8AC3E}">
+        <p14:creationId xmlns:p14="http://schemas.microsoft.com/office/powerpoint/2010/main" val="1389062987"/>
+      </p:ext>
+    </p:extLst>
+  </p:cSld>
+  <p:clrMapOvr>
+    <a:masterClrMapping/>
+  </p:clrMapOvr>
+  <p:timing>
+    <p:tnLst>
+      <p:par>
+        <p:cTn id="1" dur="indefinite" restart="never" nodeType="tmRoot">
+          <p:childTnLst>
+            <p:seq concurrent="1" nextAc="seek">
+              <p:cTn id="2" dur="indefinite" nodeType="mainSeq">
+                <p:childTnLst>
+                  <p:par>
+                    <p:cTn id="3" fill="hold">
+                      <p:stCondLst>
+                        <p:cond delay="indefinite"/>
+                        <p:cond evt="onBegin" delay="0">
+                          <p:tn val="2"/>
+                        </p:cond>
+                      </p:stCondLst>
+                      <p:childTnLst>
+                        <p:par>
+                          <p:cTn id="4" fill="hold">
+                            <p:stCondLst>
+                              <p:cond delay="0"/>
+                            </p:stCondLst>
+                            <p:childTnLst>
+                              <p:par>
+                                <p:cTn id="5" presetID="10" presetClass="entr" presetSubtype="0" fill="hold" nodeType="afterEffect">
+                                  <p:stCondLst>
+                                    <p:cond delay="0"/>
+                                  </p:stCondLst>
+                                  <p:childTnLst>
+                                    <p:set>
+                                      <p:cBhvr>
+                                        <p:cTn id="6" dur="1" fill="hold">
+                                          <p:stCondLst>
+                                            <p:cond delay="0"/>
+                                          </p:stCondLst>
+                                        </p:cTn>
+                                        <p:tgtEl>
+                                          <p:spTgt spid="9">
+                                            <p:txEl>
+                                              <p:pRg st="0" end="0"/>
+                                            </p:txEl>
+                                          </p:spTgt>
+                                        </p:tgtEl>
+                                        <p:attrNameLst>
+                                          <p:attrName>style.visibility</p:attrName>
+                                        </p:attrNameLst>
+                                      </p:cBhvr>
+                                      <p:to>
+                                        <p:strVal val="visible"/>
+                                      </p:to>
+                                    </p:set>
+                                    <p:animEffect transition="in" filter="fade">
+                                      <p:cBhvr>
+                                        <p:cTn id="7" dur="500"/>
+                                        <p:tgtEl>
+                                          <p:spTgt spid="9">
+                                            <p:txEl>
+                                              <p:pRg st="0" end="0"/>
+                                            </p:txEl>
+                                          </p:spTgt>
+                                        </p:tgtEl>
+                                      </p:cBhvr>
+                                    </p:animEffect>
+                                  </p:childTnLst>
+                                </p:cTn>
+                              </p:par>
+                            </p:childTnLst>
+                          </p:cTn>
+                        </p:par>
+                        <p:par>
+                          <p:cTn id="8" fill="hold">
+                            <p:stCondLst>
+                              <p:cond delay="500"/>
+                            </p:stCondLst>
+                            <p:childTnLst>
+                              <p:par>
+                                <p:cTn id="9" presetID="10" presetClass="entr" presetSubtype="0" fill="hold" nodeType="afterEffect">
+                                  <p:stCondLst>
+                                    <p:cond delay="0"/>
+                                  </p:stCondLst>
+                                  <p:childTnLst>
+                                    <p:set>
+                                      <p:cBhvr>
+                                        <p:cTn id="10" dur="1" fill="hold">
+                                          <p:stCondLst>
+                                            <p:cond delay="0"/>
+                                          </p:stCondLst>
+                                        </p:cTn>
+                                        <p:tgtEl>
+                                          <p:spTgt spid="9">
+                                            <p:txEl>
+                                              <p:pRg st="1" end="1"/>
+                                            </p:txEl>
+                                          </p:spTgt>
+                                        </p:tgtEl>
+                                        <p:attrNameLst>
+                                          <p:attrName>style.visibility</p:attrName>
+                                        </p:attrNameLst>
+                                      </p:cBhvr>
+                                      <p:to>
+                                        <p:strVal val="visible"/>
+                                      </p:to>
+                                    </p:set>
+                                    <p:animEffect transition="in" filter="fade">
+                                      <p:cBhvr>
+                                        <p:cTn id="11" dur="500"/>
+                                        <p:tgtEl>
+                                          <p:spTgt spid="9">
+                                            <p:txEl>
+                                              <p:pRg st="1" end="1"/>
+                                            </p:txEl>
+                                          </p:spTgt>
+                                        </p:tgtEl>
+                                      </p:cBhvr>
+                                    </p:animEffect>
+                                  </p:childTnLst>
+                                </p:cTn>
+                              </p:par>
+                            </p:childTnLst>
+                          </p:cTn>
+                        </p:par>
+                        <p:par>
+                          <p:cTn id="12" fill="hold">
+                            <p:stCondLst>
+                              <p:cond delay="1000"/>
+                            </p:stCondLst>
+                            <p:childTnLst>
+                              <p:par>
+                                <p:cTn id="13" presetID="10" presetClass="entr" presetSubtype="0" fill="hold" nodeType="afterEffect">
+                                  <p:stCondLst>
+                                    <p:cond delay="0"/>
+                                  </p:stCondLst>
+                                  <p:childTnLst>
+                                    <p:set>
+                                      <p:cBhvr>
+                                        <p:cTn id="14" dur="1" fill="hold">
+                                          <p:stCondLst>
+                                            <p:cond delay="0"/>
+                                          </p:stCondLst>
+                                        </p:cTn>
+                                        <p:tgtEl>
+                                          <p:spTgt spid="9">
+                                            <p:txEl>
+                                              <p:pRg st="2" end="2"/>
+                                            </p:txEl>
+                                          </p:spTgt>
+                                        </p:tgtEl>
+                                        <p:attrNameLst>
+                                          <p:attrName>style.visibility</p:attrName>
+                                        </p:attrNameLst>
+                                      </p:cBhvr>
+                                      <p:to>
+                                        <p:strVal val="visible"/>
+                                      </p:to>
+                                    </p:set>
+                                    <p:animEffect transition="in" filter="fade">
+                                      <p:cBhvr>
+                                        <p:cTn id="15" dur="500"/>
+                                        <p:tgtEl>
+                                          <p:spTgt spid="9">
+                                            <p:txEl>
+                                              <p:pRg st="2" end="2"/>
+                                            </p:txEl>
+                                          </p:spTgt>
+                                        </p:tgtEl>
+                                      </p:cBhvr>
+                                    </p:animEffect>
+                                  </p:childTnLst>
+                                </p:cTn>
+                              </p:par>
+                            </p:childTnLst>
+                          </p:cTn>
+                        </p:par>
+                      </p:childTnLst>
+                    </p:cTn>
+                  </p:par>
+                </p:childTnLst>
+              </p:cTn>
+              <p:prevCondLst>
+                <p:cond evt="onPrev" delay="0">
+                  <p:tgtEl>
+                    <p:sldTgt/>
+                  </p:tgtEl>
+                </p:cond>
+              </p:prevCondLst>
+              <p:nextCondLst>
+                <p:cond evt="onNext" delay="0">
+                  <p:tgtEl>
+                    <p:sldTgt/>
+                  </p:tgtEl>
+                </p:cond>
+              </p:nextCondLst>
+            </p:seq>
+          </p:childTnLst>
+        </p:cTn>
+      </p:par>
+    </p:tnLst>
+  </p:timing>
+</p:sld>
+</file>
+
+<file path=ppt/slides/slide9.xml><?xml version="1.0" encoding="utf-8"?>
+<p:sld xmlns:a="http://schemas.openxmlformats.org/drawingml/2006/main" xmlns:r="http://schemas.openxmlformats.org/officeDocument/2006/relationships" xmlns:p="http://schemas.openxmlformats.org/presentationml/2006/main">
+  <p:cSld>
+    <p:bg>
+      <p:bgPr>
+        <a:solidFill>
+          <a:schemeClr val="bg1"/>
+        </a:solidFill>
+        <a:effectLst/>
+      </p:bgPr>
+    </p:bg>
+    <p:spTree>
+      <p:nvGrpSpPr>
+        <p:cNvPr id="1" name=""/>
+        <p:cNvGrpSpPr/>
+        <p:nvPr/>
+      </p:nvGrpSpPr>
+      <p:grpSpPr>
+        <a:xfrm>
+          <a:off x="0" y="0"/>
+          <a:ext cx="0" cy="0"/>
+          <a:chOff x="0" y="0"/>
+          <a:chExt cx="0" cy="0"/>
+        </a:xfrm>
+      </p:grpSpPr>
+      <p:sp>
+        <p:nvSpPr>
           <p:cNvPr id="58" name="Rectangle 57">
             <a:extLst>
               <a:ext uri="{FF2B5EF4-FFF2-40B4-BE49-F238E27FC236}">
@@ -11867,564 +12774,6 @@
   </p:clrMapOvr>
   <p:transition spd="slow">
     <p:push dir="u"/>
-  </p:transition>
-</p:sld>
-</file>
-
-<file path=ppt/slides/slide9.xml><?xml version="1.0" encoding="utf-8"?>
-<p:sld xmlns:a="http://schemas.openxmlformats.org/drawingml/2006/main" xmlns:r="http://schemas.openxmlformats.org/officeDocument/2006/relationships" xmlns:p="http://schemas.openxmlformats.org/presentationml/2006/main">
-  <p:cSld>
-    <p:spTree>
-      <p:nvGrpSpPr>
-        <p:cNvPr id="1" name=""/>
-        <p:cNvGrpSpPr/>
-        <p:nvPr/>
-      </p:nvGrpSpPr>
-      <p:grpSpPr>
-        <a:xfrm>
-          <a:off x="0" y="0"/>
-          <a:ext cx="0" cy="0"/>
-          <a:chOff x="0" y="0"/>
-          <a:chExt cx="0" cy="0"/>
-        </a:xfrm>
-      </p:grpSpPr>
-      <p:sp>
-        <p:nvSpPr>
-          <p:cNvPr id="2" name="Title 1">
-            <a:extLst>
-              <a:ext uri="{FF2B5EF4-FFF2-40B4-BE49-F238E27FC236}">
-                <a16:creationId xmlns:a16="http://schemas.microsoft.com/office/drawing/2014/main" id="{97A62892-0949-4D84-B5A8-62A8F1EDA293}"/>
-              </a:ext>
-            </a:extLst>
-          </p:cNvPr>
-          <p:cNvSpPr>
-            <a:spLocks noGrp="1"/>
-          </p:cNvSpPr>
-          <p:nvPr>
-            <p:ph type="title"/>
-          </p:nvPr>
-        </p:nvSpPr>
-        <p:spPr>
-          <a:xfrm>
-            <a:off x="4970109" y="484632"/>
-            <a:ext cx="6730277" cy="1609344"/>
-          </a:xfrm>
-          <a:ln>
-            <a:noFill/>
-          </a:ln>
-        </p:spPr>
-        <p:txBody>
-          <a:bodyPr vert="horz" lIns="91440" tIns="45720" rIns="91440" bIns="45720" rtlCol="0" anchor="ctr">
-            <a:normAutofit/>
-          </a:bodyPr>
-          <a:lstStyle/>
-          <a:p>
-            <a:r>
-              <a:rPr lang="en-US" sz="4800" dirty="0">
-                <a:latin typeface="+mn-lt"/>
-              </a:rPr>
-              <a:t>Questions?</a:t>
-            </a:r>
-          </a:p>
-        </p:txBody>
-      </p:sp>
-      <p:pic>
-        <p:nvPicPr>
-          <p:cNvPr id="7" name="Picture Placeholder 6">
-            <a:extLst>
-              <a:ext uri="{FF2B5EF4-FFF2-40B4-BE49-F238E27FC236}">
-                <a16:creationId xmlns:a16="http://schemas.microsoft.com/office/drawing/2014/main" id="{7E7732E9-971A-411E-9814-B8A7D3D9DC0F}"/>
-              </a:ext>
-            </a:extLst>
-          </p:cNvPr>
-          <p:cNvPicPr>
-            <a:picLocks noGrp="1" noChangeAspect="1"/>
-          </p:cNvPicPr>
-          <p:nvPr>
-            <p:ph type="pic" idx="1"/>
-          </p:nvPr>
-        </p:nvPicPr>
-        <p:blipFill rotWithShape="1">
-          <a:blip r:embed="rId3">
-            <a:extLst>
-              <a:ext uri="{28A0092B-C50C-407E-A947-70E740481C1C}">
-                <a14:useLocalDpi xmlns:a14="http://schemas.microsoft.com/office/drawing/2010/main" val="0"/>
-              </a:ext>
-            </a:extLst>
-          </a:blip>
-          <a:srcRect l="681" r="28739"/>
-          <a:stretch/>
-        </p:blipFill>
-        <p:spPr>
-          <a:xfrm>
-            <a:off x="3344" y="10"/>
-            <a:ext cx="4646726" cy="6857990"/>
-          </a:xfrm>
-          <a:prstGeom prst="rect">
-            <a:avLst/>
-          </a:prstGeom>
-        </p:spPr>
-      </p:pic>
-      <p:sp>
-        <p:nvSpPr>
-          <p:cNvPr id="4" name="Text Placeholder 3">
-            <a:extLst>
-              <a:ext uri="{FF2B5EF4-FFF2-40B4-BE49-F238E27FC236}">
-                <a16:creationId xmlns:a16="http://schemas.microsoft.com/office/drawing/2014/main" id="{428897B1-F414-45D0-A4AE-36AC2244AD13}"/>
-              </a:ext>
-            </a:extLst>
-          </p:cNvPr>
-          <p:cNvSpPr>
-            <a:spLocks noGrp="1"/>
-          </p:cNvSpPr>
-          <p:nvPr>
-            <p:ph type="body" sz="half" idx="2"/>
-          </p:nvPr>
-        </p:nvSpPr>
-        <p:spPr>
-          <a:xfrm>
-            <a:off x="4970109" y="1624083"/>
-            <a:ext cx="6730276" cy="4954137"/>
-          </a:xfrm>
-        </p:spPr>
-        <p:txBody>
-          <a:bodyPr vert="horz" lIns="91440" tIns="45720" rIns="91440" bIns="45720" rtlCol="0">
-            <a:normAutofit fontScale="92500" lnSpcReduction="10000"/>
-          </a:bodyPr>
-          <a:lstStyle/>
-          <a:p>
-            <a:pPr marL="514350" lvl="1" indent="-285750" defTabSz="932742">
-              <a:lnSpc>
-                <a:spcPct val="100000"/>
-              </a:lnSpc>
-              <a:spcBef>
-                <a:spcPct val="20000"/>
-              </a:spcBef>
-              <a:spcAft>
-                <a:spcPts val="600"/>
-              </a:spcAft>
-              <a:buClrTx/>
-              <a:buSzPct val="90000"/>
-              <a:buBlip>
-                <a:blip r:embed="rId4"/>
-              </a:buBlip>
-            </a:pPr>
-            <a:r>
-              <a:rPr lang="en-US" sz="2400" dirty="0">
-                <a:latin typeface="Segoe UI"/>
-              </a:rPr>
-              <a:t>@</a:t>
-            </a:r>
-            <a:r>
-              <a:rPr lang="en-US" sz="2400" dirty="0" err="1">
-                <a:latin typeface="Segoe UI"/>
-              </a:rPr>
-              <a:t>MrThomasRayner</a:t>
-            </a:r>
-            <a:endParaRPr lang="en-US" sz="2400" dirty="0">
-              <a:latin typeface="Segoe UI"/>
-            </a:endParaRPr>
-          </a:p>
-          <a:p>
-            <a:pPr marL="514350" lvl="1" indent="-285750" defTabSz="932742">
-              <a:lnSpc>
-                <a:spcPct val="100000"/>
-              </a:lnSpc>
-              <a:spcBef>
-                <a:spcPct val="20000"/>
-              </a:spcBef>
-              <a:spcAft>
-                <a:spcPts val="600"/>
-              </a:spcAft>
-              <a:buClrTx/>
-              <a:buSzPct val="90000"/>
-              <a:buBlip>
-                <a:blip r:embed="rId4"/>
-              </a:buBlip>
-            </a:pPr>
-            <a:endParaRPr lang="en-US" sz="2400" dirty="0">
-              <a:latin typeface="Segoe UI"/>
-            </a:endParaRPr>
-          </a:p>
-          <a:p>
-            <a:pPr marL="514350" lvl="1" indent="-285750" defTabSz="932742">
-              <a:lnSpc>
-                <a:spcPct val="100000"/>
-              </a:lnSpc>
-              <a:spcBef>
-                <a:spcPct val="20000"/>
-              </a:spcBef>
-              <a:spcAft>
-                <a:spcPts val="600"/>
-              </a:spcAft>
-              <a:buClrTx/>
-              <a:buSzPct val="90000"/>
-              <a:buBlip>
-                <a:blip r:embed="rId4"/>
-              </a:buBlip>
-            </a:pPr>
-            <a:r>
-              <a:rPr lang="en-US" sz="2400" dirty="0">
-                <a:latin typeface="Segoe UI"/>
-              </a:rPr>
-              <a:t>thomasrayner.ca</a:t>
-            </a:r>
-          </a:p>
-          <a:p>
-            <a:pPr marL="514350" lvl="1" indent="-285750" defTabSz="932742">
-              <a:lnSpc>
-                <a:spcPct val="100000"/>
-              </a:lnSpc>
-              <a:spcBef>
-                <a:spcPct val="20000"/>
-              </a:spcBef>
-              <a:spcAft>
-                <a:spcPts val="600"/>
-              </a:spcAft>
-              <a:buClrTx/>
-              <a:buSzPct val="90000"/>
-              <a:buBlip>
-                <a:blip r:embed="rId4"/>
-              </a:buBlip>
-            </a:pPr>
-            <a:endParaRPr lang="en-US" sz="2400" dirty="0">
-              <a:latin typeface="Segoe UI"/>
-            </a:endParaRPr>
-          </a:p>
-          <a:p>
-            <a:pPr marL="514350" lvl="1" indent="-285750" defTabSz="932742">
-              <a:lnSpc>
-                <a:spcPct val="100000"/>
-              </a:lnSpc>
-              <a:spcBef>
-                <a:spcPct val="20000"/>
-              </a:spcBef>
-              <a:spcAft>
-                <a:spcPts val="600"/>
-              </a:spcAft>
-              <a:buClrTx/>
-              <a:buSzPct val="90000"/>
-              <a:buBlip>
-                <a:blip r:embed="rId4"/>
-              </a:buBlip>
-            </a:pPr>
-            <a:r>
-              <a:rPr lang="en-US" sz="2400" dirty="0">
-                <a:latin typeface="Segoe UI"/>
-              </a:rPr>
-              <a:t>github.com/</a:t>
-            </a:r>
-            <a:r>
-              <a:rPr lang="en-US" sz="2400" dirty="0" err="1">
-                <a:latin typeface="Segoe UI"/>
-              </a:rPr>
-              <a:t>thomasrayner</a:t>
-            </a:r>
-            <a:endParaRPr lang="en-US" sz="2400" dirty="0">
-              <a:latin typeface="Segoe UI"/>
-            </a:endParaRPr>
-          </a:p>
-          <a:p>
-            <a:pPr marL="514350" lvl="1" indent="-285750" defTabSz="932742">
-              <a:lnSpc>
-                <a:spcPct val="100000"/>
-              </a:lnSpc>
-              <a:spcBef>
-                <a:spcPct val="20000"/>
-              </a:spcBef>
-              <a:spcAft>
-                <a:spcPts val="0"/>
-              </a:spcAft>
-              <a:buClrTx/>
-              <a:buSzPct val="90000"/>
-              <a:buBlip>
-                <a:blip r:embed="rId4"/>
-              </a:buBlip>
-            </a:pPr>
-            <a:endParaRPr lang="en-US" sz="2400" dirty="0">
-              <a:latin typeface="Segoe UI"/>
-            </a:endParaRPr>
-          </a:p>
-          <a:p>
-            <a:pPr marL="514350" lvl="1" indent="-285750" defTabSz="932742">
-              <a:lnSpc>
-                <a:spcPct val="100000"/>
-              </a:lnSpc>
-              <a:spcBef>
-                <a:spcPct val="20000"/>
-              </a:spcBef>
-              <a:spcAft>
-                <a:spcPts val="0"/>
-              </a:spcAft>
-              <a:buClrTx/>
-              <a:buSzPct val="90000"/>
-              <a:buBlip>
-                <a:blip r:embed="rId4"/>
-              </a:buBlip>
-            </a:pPr>
-            <a:r>
-              <a:rPr lang="en-US" sz="2400" dirty="0">
-                <a:latin typeface="Segoe UI"/>
-              </a:rPr>
-              <a:t>PowerShell </a:t>
-            </a:r>
-            <a:r>
-              <a:rPr lang="en-US" sz="2400" dirty="0">
-                <a:solidFill>
-                  <a:srgbClr val="00B294"/>
-                </a:solidFill>
-                <a:latin typeface="Segoe UI"/>
-              </a:rPr>
-              <a:t>Discord</a:t>
-            </a:r>
-            <a:r>
-              <a:rPr lang="en-US" sz="2400" dirty="0">
-                <a:latin typeface="Segoe UI"/>
-              </a:rPr>
-              <a:t>/</a:t>
-            </a:r>
-            <a:r>
-              <a:rPr lang="en-US" sz="2400" dirty="0">
-                <a:solidFill>
-                  <a:srgbClr val="00BCF2"/>
-                </a:solidFill>
-                <a:latin typeface="Segoe UI"/>
-              </a:rPr>
-              <a:t>Slack</a:t>
-            </a:r>
-            <a:r>
-              <a:rPr lang="en-US" sz="2400" dirty="0">
-                <a:gradFill>
-                  <a:gsLst>
-                    <a:gs pos="1250">
-                      <a:prstClr val="white"/>
-                    </a:gs>
-                    <a:gs pos="100000">
-                      <a:prstClr val="white"/>
-                    </a:gs>
-                  </a:gsLst>
-                  <a:lin ang="5400000" scaled="0"/>
-                </a:gradFill>
-                <a:latin typeface="Segoe UI"/>
-              </a:rPr>
-              <a:t> 	</a:t>
-            </a:r>
-          </a:p>
-          <a:p>
-            <a:pPr marL="228600" lvl="1" defTabSz="932742">
-              <a:lnSpc>
-                <a:spcPct val="100000"/>
-              </a:lnSpc>
-              <a:spcBef>
-                <a:spcPts val="0"/>
-              </a:spcBef>
-              <a:spcAft>
-                <a:spcPts val="600"/>
-              </a:spcAft>
-              <a:buClrTx/>
-              <a:buSzPct val="90000"/>
-            </a:pPr>
-            <a:r>
-              <a:rPr lang="en-US" sz="1800" dirty="0">
-                <a:solidFill>
-                  <a:prstClr val="white"/>
-                </a:solidFill>
-                <a:latin typeface="Segoe UI"/>
-              </a:rPr>
-              <a:t>          </a:t>
-            </a:r>
-            <a:r>
-              <a:rPr lang="en-US" sz="1800" dirty="0">
-                <a:latin typeface="Segoe UI"/>
-              </a:rPr>
-              <a:t>Join</a:t>
-            </a:r>
-            <a:r>
-              <a:rPr lang="en-US" sz="1800" dirty="0">
-                <a:solidFill>
-                  <a:prstClr val="white"/>
-                </a:solidFill>
-                <a:latin typeface="Segoe UI"/>
-              </a:rPr>
-              <a:t>: </a:t>
-            </a:r>
-            <a:r>
-              <a:rPr lang="en-US" sz="1800" dirty="0">
-                <a:solidFill>
-                  <a:srgbClr val="00B294"/>
-                </a:solidFill>
-                <a:latin typeface="Segoe UI"/>
-              </a:rPr>
-              <a:t>j.mp/</a:t>
-            </a:r>
-            <a:r>
-              <a:rPr lang="en-US" sz="1800" dirty="0" err="1">
-                <a:solidFill>
-                  <a:srgbClr val="00B294"/>
-                </a:solidFill>
-                <a:latin typeface="Segoe UI"/>
-              </a:rPr>
-              <a:t>psdiscord</a:t>
-            </a:r>
-            <a:r>
-              <a:rPr lang="en-US" sz="1800" dirty="0">
-                <a:latin typeface="Segoe UI"/>
-              </a:rPr>
-              <a:t> or </a:t>
-            </a:r>
-            <a:r>
-              <a:rPr lang="en-US" sz="1800" dirty="0">
-                <a:solidFill>
-                  <a:srgbClr val="00BCF2"/>
-                </a:solidFill>
-                <a:latin typeface="Segoe UI"/>
-              </a:rPr>
-              <a:t>j.mp/</a:t>
-            </a:r>
-            <a:r>
-              <a:rPr lang="en-US" sz="1800" dirty="0" err="1">
-                <a:solidFill>
-                  <a:srgbClr val="00BCF2"/>
-                </a:solidFill>
-                <a:latin typeface="Segoe UI"/>
-              </a:rPr>
-              <a:t>psslack</a:t>
-            </a:r>
-            <a:endParaRPr lang="en-US" sz="1800" dirty="0">
-              <a:solidFill>
-                <a:srgbClr val="00BCF2"/>
-              </a:solidFill>
-              <a:latin typeface="Segoe UI"/>
-            </a:endParaRPr>
-          </a:p>
-          <a:p>
-            <a:pPr marL="514350" lvl="1" indent="-285750" defTabSz="932742">
-              <a:lnSpc>
-                <a:spcPct val="100000"/>
-              </a:lnSpc>
-              <a:spcBef>
-                <a:spcPts val="0"/>
-              </a:spcBef>
-              <a:spcAft>
-                <a:spcPts val="600"/>
-              </a:spcAft>
-              <a:buClrTx/>
-              <a:buSzPct val="90000"/>
-              <a:buBlip>
-                <a:blip r:embed="rId4"/>
-              </a:buBlip>
-            </a:pPr>
-            <a:endParaRPr lang="en-US" sz="2400" dirty="0">
-              <a:latin typeface="Segoe UI"/>
-            </a:endParaRPr>
-          </a:p>
-          <a:p>
-            <a:pPr marL="514350" lvl="1" indent="-285750" defTabSz="932742">
-              <a:lnSpc>
-                <a:spcPct val="100000"/>
-              </a:lnSpc>
-              <a:spcBef>
-                <a:spcPts val="0"/>
-              </a:spcBef>
-              <a:spcAft>
-                <a:spcPts val="600"/>
-              </a:spcAft>
-              <a:buClrTx/>
-              <a:buSzPct val="90000"/>
-              <a:buBlip>
-                <a:blip r:embed="rId4"/>
-              </a:buBlip>
-            </a:pPr>
-            <a:r>
-              <a:rPr lang="en-US" sz="2400" dirty="0">
-                <a:latin typeface="Segoe UI"/>
-              </a:rPr>
-              <a:t>pluralsight.com/authors/</a:t>
-            </a:r>
-            <a:r>
-              <a:rPr lang="en-US" sz="2400" dirty="0" err="1">
-                <a:latin typeface="Segoe UI"/>
-              </a:rPr>
-              <a:t>thomas-rayner</a:t>
-            </a:r>
-            <a:endParaRPr lang="en-US" sz="2400" dirty="0">
-              <a:latin typeface="Segoe UI"/>
-            </a:endParaRPr>
-          </a:p>
-          <a:p>
-            <a:pPr marL="514350" lvl="1" indent="-285750" defTabSz="932742">
-              <a:lnSpc>
-                <a:spcPct val="100000"/>
-              </a:lnSpc>
-              <a:spcBef>
-                <a:spcPts val="0"/>
-              </a:spcBef>
-              <a:spcAft>
-                <a:spcPts val="600"/>
-              </a:spcAft>
-              <a:buClrTx/>
-              <a:buSzPct val="90000"/>
-              <a:buBlip>
-                <a:blip r:embed="rId4"/>
-              </a:buBlip>
-            </a:pPr>
-            <a:endParaRPr lang="en-US" sz="2400" dirty="0">
-              <a:latin typeface="Segoe UI"/>
-            </a:endParaRPr>
-          </a:p>
-          <a:p>
-            <a:pPr marL="514350" lvl="1" indent="-285750" defTabSz="932742">
-              <a:lnSpc>
-                <a:spcPct val="100000"/>
-              </a:lnSpc>
-              <a:spcBef>
-                <a:spcPts val="0"/>
-              </a:spcBef>
-              <a:spcAft>
-                <a:spcPts val="600"/>
-              </a:spcAft>
-              <a:buClrTx/>
-              <a:buSzPct val="90000"/>
-              <a:buBlip>
-                <a:blip r:embed="rId4"/>
-              </a:buBlip>
-            </a:pPr>
-            <a:r>
-              <a:rPr lang="en-US" sz="2400" dirty="0">
-                <a:latin typeface="Segoe UI"/>
-              </a:rPr>
-              <a:t>Master PowerShell Tricks books</a:t>
-            </a:r>
-            <a:endParaRPr lang="en-US" sz="3200" dirty="0">
-              <a:latin typeface="Segoe UI"/>
-            </a:endParaRPr>
-          </a:p>
-          <a:p>
-            <a:pPr>
-              <a:lnSpc>
-                <a:spcPct val="90000"/>
-              </a:lnSpc>
-            </a:pPr>
-            <a:endParaRPr lang="en-US" sz="2800" dirty="0">
-              <a:solidFill>
-                <a:schemeClr val="tx1"/>
-              </a:solidFill>
-            </a:endParaRPr>
-          </a:p>
-        </p:txBody>
-      </p:sp>
-    </p:spTree>
-    <p:extLst>
-      <p:ext uri="{BB962C8B-B14F-4D97-AF65-F5344CB8AC3E}">
-        <p14:creationId xmlns:p14="http://schemas.microsoft.com/office/powerpoint/2010/main" val="3379601973"/>
-      </p:ext>
-    </p:extLst>
-  </p:cSld>
-  <p:clrMapOvr>
-    <a:masterClrMapping/>
-  </p:clrMapOvr>
-  <p:transition spd="med">
-    <p:pull/>
   </p:transition>
 </p:sld>
 </file>

</xml_diff>